<commit_message>
Updated example and doc
</commit_message>
<xml_diff>
--- a/doc/backup_vs_live_tracking.pptx
+++ b/doc/backup_vs_live_tracking.pptx
@@ -197,7 +197,7 @@
           </a:lstStyle>
           <a:p>
             <a:fld id="{EAD27F31-BF5F-7F40-A56D-7CEE75C730A9}" type="datetimeFigureOut">
-              <a:t>20/09/2022</a:t>
+              <a:t>20/10/2022</a:t>
             </a:fld>
             <a:endParaRPr lang="fr-FR"/>
           </a:p>
@@ -692,7 +692,7 @@
           <a:lstStyle/>
           <a:p>
             <a:fld id="{DB59BE99-1D5B-A54A-987A-4EB64A74179F}" type="datetimeFigureOut">
-              <a:t>20/09/2022</a:t>
+              <a:t>20/10/2022</a:t>
             </a:fld>
             <a:endParaRPr lang="fr-FR"/>
           </a:p>
@@ -888,7 +888,7 @@
           <a:lstStyle/>
           <a:p>
             <a:fld id="{DB59BE99-1D5B-A54A-987A-4EB64A74179F}" type="datetimeFigureOut">
-              <a:t>20/09/2022</a:t>
+              <a:t>20/10/2022</a:t>
             </a:fld>
             <a:endParaRPr lang="fr-FR"/>
           </a:p>
@@ -1094,7 +1094,7 @@
           <a:lstStyle/>
           <a:p>
             <a:fld id="{DB59BE99-1D5B-A54A-987A-4EB64A74179F}" type="datetimeFigureOut">
-              <a:t>20/09/2022</a:t>
+              <a:t>20/10/2022</a:t>
             </a:fld>
             <a:endParaRPr lang="fr-FR"/>
           </a:p>
@@ -1290,7 +1290,7 @@
           <a:lstStyle/>
           <a:p>
             <a:fld id="{DB59BE99-1D5B-A54A-987A-4EB64A74179F}" type="datetimeFigureOut">
-              <a:t>20/09/2022</a:t>
+              <a:t>20/10/2022</a:t>
             </a:fld>
             <a:endParaRPr lang="fr-FR"/>
           </a:p>
@@ -1563,7 +1563,7 @@
           <a:lstStyle/>
           <a:p>
             <a:fld id="{DB59BE99-1D5B-A54A-987A-4EB64A74179F}" type="datetimeFigureOut">
-              <a:t>20/09/2022</a:t>
+              <a:t>20/10/2022</a:t>
             </a:fld>
             <a:endParaRPr lang="fr-FR"/>
           </a:p>
@@ -1826,7 +1826,7 @@
           <a:lstStyle/>
           <a:p>
             <a:fld id="{DB59BE99-1D5B-A54A-987A-4EB64A74179F}" type="datetimeFigureOut">
-              <a:t>20/09/2022</a:t>
+              <a:t>20/10/2022</a:t>
             </a:fld>
             <a:endParaRPr lang="fr-FR"/>
           </a:p>
@@ -2236,7 +2236,7 @@
           <a:lstStyle/>
           <a:p>
             <a:fld id="{DB59BE99-1D5B-A54A-987A-4EB64A74179F}" type="datetimeFigureOut">
-              <a:t>20/09/2022</a:t>
+              <a:t>20/10/2022</a:t>
             </a:fld>
             <a:endParaRPr lang="fr-FR"/>
           </a:p>
@@ -2375,7 +2375,7 @@
           <a:lstStyle/>
           <a:p>
             <a:fld id="{DB59BE99-1D5B-A54A-987A-4EB64A74179F}" type="datetimeFigureOut">
-              <a:t>20/09/2022</a:t>
+              <a:t>20/10/2022</a:t>
             </a:fld>
             <a:endParaRPr lang="fr-FR"/>
           </a:p>
@@ -2486,7 +2486,7 @@
           <a:lstStyle/>
           <a:p>
             <a:fld id="{DB59BE99-1D5B-A54A-987A-4EB64A74179F}" type="datetimeFigureOut">
-              <a:t>20/09/2022</a:t>
+              <a:t>20/10/2022</a:t>
             </a:fld>
             <a:endParaRPr lang="fr-FR"/>
           </a:p>
@@ -2795,7 +2795,7 @@
           <a:lstStyle/>
           <a:p>
             <a:fld id="{DB59BE99-1D5B-A54A-987A-4EB64A74179F}" type="datetimeFigureOut">
-              <a:t>20/09/2022</a:t>
+              <a:t>20/10/2022</a:t>
             </a:fld>
             <a:endParaRPr lang="fr-FR"/>
           </a:p>
@@ -3081,7 +3081,7 @@
           <a:lstStyle/>
           <a:p>
             <a:fld id="{DB59BE99-1D5B-A54A-987A-4EB64A74179F}" type="datetimeFigureOut">
-              <a:t>20/09/2022</a:t>
+              <a:t>20/10/2022</a:t>
             </a:fld>
             <a:endParaRPr lang="fr-FR"/>
           </a:p>
@@ -3320,7 +3320,7 @@
           </a:lstStyle>
           <a:p>
             <a:fld id="{DB59BE99-1D5B-A54A-987A-4EB64A74179F}" type="datetimeFigureOut">
-              <a:t>20/09/2022</a:t>
+              <a:t>20/10/2022</a:t>
             </a:fld>
             <a:endParaRPr lang="fr-FR"/>
           </a:p>
@@ -21428,8 +21428,8 @@
         </p:nvSpPr>
         <p:spPr>
           <a:xfrm>
-            <a:off x="829259" y="4128981"/>
-            <a:ext cx="1460519" cy="646331"/>
+            <a:off x="829259" y="4084591"/>
+            <a:ext cx="1830436" cy="738664"/>
           </a:xfrm>
           <a:prstGeom prst="rect">
             <a:avLst/>
@@ -21443,7 +21443,7 @@
           <a:lstStyle/>
           <a:p>
             <a:r>
-              <a:rPr lang="fr-FR" sz="1200">
+              <a:rPr lang="fr-FR" sz="1400">
                 <a:latin typeface="Avenir Book" panose="02000503020000020003" pitchFamily="2" charset="0"/>
               </a:rPr>
               <a:t>Information kept</a:t>
@@ -21451,7 +21451,7 @@
           </a:p>
           <a:p>
             <a:r>
-              <a:rPr lang="fr-FR" sz="1200">
+              <a:rPr lang="fr-FR" sz="1400">
                 <a:latin typeface="Avenir Book" panose="02000503020000020003" pitchFamily="2" charset="0"/>
               </a:rPr>
               <a:t>in live memory</a:t>
@@ -21459,10 +21459,10 @@
           </a:p>
           <a:p>
             <a:r>
-              <a:rPr lang="fr-FR" sz="1200">
+              <a:rPr lang="fr-FR" sz="1400">
                 <a:latin typeface="Avenir Book" panose="02000503020000020003" pitchFamily="2" charset="0"/>
               </a:rPr>
-              <a:t>(no backup)</a:t>
+              <a:t>(no backup needed)</a:t>
             </a:r>
           </a:p>
         </p:txBody>
@@ -21497,43 +21497,6 @@
           </a:prstGeom>
         </p:spPr>
       </p:pic>
-      <p:sp>
-        <p:nvSpPr>
-          <p:cNvPr id="285" name="ZoneTexte 284">
-            <a:extLst>
-              <a:ext uri="{FF2B5EF4-FFF2-40B4-BE49-F238E27FC236}">
-                <a16:creationId xmlns:a16="http://schemas.microsoft.com/office/drawing/2014/main" id="{08CBBB21-CF3F-7A7D-6F1C-0BA0C0F29041}"/>
-              </a:ext>
-            </a:extLst>
-          </p:cNvPr>
-          <p:cNvSpPr txBox="1"/>
-          <p:nvPr/>
-        </p:nvSpPr>
-        <p:spPr>
-          <a:xfrm>
-            <a:off x="6167281" y="3846885"/>
-            <a:ext cx="1468502" cy="954107"/>
-          </a:xfrm>
-          <a:prstGeom prst="rect">
-            <a:avLst/>
-          </a:prstGeom>
-          <a:noFill/>
-        </p:spPr>
-        <p:txBody>
-          <a:bodyPr wrap="square" rtlCol="0">
-            <a:spAutoFit/>
-          </a:bodyPr>
-          <a:lstStyle/>
-          <a:p>
-            <a:r>
-              <a:rPr lang="fr-FR" sz="1400">
-                <a:latin typeface="Avenir Book" panose="02000503020000020003" pitchFamily="2" charset="0"/>
-              </a:rPr>
-              <a:t>Lineage and phylogenetic data available at any time</a:t>
-            </a:r>
-          </a:p>
-        </p:txBody>
-      </p:sp>
       <p:cxnSp>
         <p:nvCxnSpPr>
           <p:cNvPr id="287" name="Connecteur droit 286">
@@ -22001,10 +21964,7 @@
           <a:noFill/>
           <a:ln w="6350">
             <a:solidFill>
-              <a:schemeClr val="tx1">
-                <a:lumMod val="50000"/>
-                <a:lumOff val="50000"/>
-              </a:schemeClr>
+              <a:schemeClr val="tx1"/>
             </a:solidFill>
           </a:ln>
         </p:spPr>
@@ -22032,10 +21992,7 @@
             <a:r>
               <a:rPr lang="fr-FR" sz="1200">
                 <a:solidFill>
-                  <a:schemeClr val="tx1">
-                    <a:lumMod val="50000"/>
-                    <a:lumOff val="50000"/>
-                  </a:schemeClr>
+                  <a:schemeClr val="tx1"/>
                 </a:solidFill>
                 <a:latin typeface="Avenir Book" panose="02000503020000020003" pitchFamily="2" charset="0"/>
               </a:rPr>
@@ -23503,10 +23460,7 @@
           <a:noFill/>
           <a:ln w="6350">
             <a:solidFill>
-              <a:schemeClr val="tx1">
-                <a:lumMod val="50000"/>
-                <a:lumOff val="50000"/>
-              </a:schemeClr>
+              <a:schemeClr val="tx1"/>
             </a:solidFill>
           </a:ln>
         </p:spPr>
@@ -23534,10 +23488,7 @@
             <a:r>
               <a:rPr lang="fr-FR" sz="1200">
                 <a:solidFill>
-                  <a:schemeClr val="tx1">
-                    <a:lumMod val="50000"/>
-                    <a:lumOff val="50000"/>
-                  </a:schemeClr>
+                  <a:schemeClr val="tx1"/>
                 </a:solidFill>
                 <a:latin typeface="Avenir Book" panose="02000503020000020003" pitchFamily="2" charset="0"/>
               </a:rPr>
@@ -23577,12 +23528,6 @@
             <a:pPr algn="ctr"/>
             <a:r>
               <a:rPr lang="fr-FR" sz="1400">
-                <a:solidFill>
-                  <a:schemeClr val="tx1">
-                    <a:lumMod val="50000"/>
-                    <a:lumOff val="50000"/>
-                  </a:schemeClr>
-                </a:solidFill>
                 <a:latin typeface="Avenir Book" panose="02000503020000020003" pitchFamily="2" charset="0"/>
               </a:rPr>
               <a:t>Regular backups</a:t>
@@ -23621,15 +23566,99 @@
             <a:pPr algn="ctr"/>
             <a:r>
               <a:rPr lang="fr-FR" sz="1400">
-                <a:solidFill>
-                  <a:schemeClr val="tx1">
-                    <a:lumMod val="50000"/>
-                    <a:lumOff val="50000"/>
-                  </a:schemeClr>
-                </a:solidFill>
                 <a:latin typeface="Avenir Book" panose="02000503020000020003" pitchFamily="2" charset="0"/>
               </a:rPr>
               <a:t>Live tracking</a:t>
+            </a:r>
+          </a:p>
+        </p:txBody>
+      </p:sp>
+      <p:sp>
+        <p:nvSpPr>
+          <p:cNvPr id="15" name="ZoneTexte 14">
+            <a:extLst>
+              <a:ext uri="{FF2B5EF4-FFF2-40B4-BE49-F238E27FC236}">
+                <a16:creationId xmlns:a16="http://schemas.microsoft.com/office/drawing/2014/main" id="{1F001223-A471-7968-2775-396E6B517141}"/>
+              </a:ext>
+            </a:extLst>
+          </p:cNvPr>
+          <p:cNvSpPr txBox="1"/>
+          <p:nvPr/>
+        </p:nvSpPr>
+        <p:spPr>
+          <a:xfrm>
+            <a:off x="5923444" y="3241779"/>
+            <a:ext cx="1634141" cy="523220"/>
+          </a:xfrm>
+          <a:prstGeom prst="rect">
+            <a:avLst/>
+          </a:prstGeom>
+          <a:noFill/>
+        </p:spPr>
+        <p:txBody>
+          <a:bodyPr wrap="square" rtlCol="0">
+            <a:spAutoFit/>
+          </a:bodyPr>
+          <a:lstStyle/>
+          <a:p>
+            <a:r>
+              <a:rPr lang="fr-FR" sz="1400">
+                <a:latin typeface="Avenir Book" panose="02000503020000020003" pitchFamily="2" charset="0"/>
+              </a:rPr>
+              <a:t>Lineage</a:t>
+            </a:r>
+          </a:p>
+          <a:p>
+            <a:r>
+              <a:rPr lang="fr-FR" sz="1400">
+                <a:latin typeface="Avenir Book" panose="02000503020000020003" pitchFamily="2" charset="0"/>
+              </a:rPr>
+              <a:t>tree</a:t>
+            </a:r>
+          </a:p>
+        </p:txBody>
+      </p:sp>
+      <p:sp>
+        <p:nvSpPr>
+          <p:cNvPr id="16" name="ZoneTexte 15">
+            <a:extLst>
+              <a:ext uri="{FF2B5EF4-FFF2-40B4-BE49-F238E27FC236}">
+                <a16:creationId xmlns:a16="http://schemas.microsoft.com/office/drawing/2014/main" id="{0681211E-0383-B330-1A0A-ECAC69F09BE3}"/>
+              </a:ext>
+            </a:extLst>
+          </p:cNvPr>
+          <p:cNvSpPr txBox="1"/>
+          <p:nvPr/>
+        </p:nvSpPr>
+        <p:spPr>
+          <a:xfrm>
+            <a:off x="5929276" y="4892920"/>
+            <a:ext cx="1634141" cy="523220"/>
+          </a:xfrm>
+          <a:prstGeom prst="rect">
+            <a:avLst/>
+          </a:prstGeom>
+          <a:noFill/>
+        </p:spPr>
+        <p:txBody>
+          <a:bodyPr wrap="square" rtlCol="0">
+            <a:spAutoFit/>
+          </a:bodyPr>
+          <a:lstStyle/>
+          <a:p>
+            <a:r>
+              <a:rPr lang="fr-FR" sz="1400">
+                <a:latin typeface="Avenir Book" panose="02000503020000020003" pitchFamily="2" charset="0"/>
+              </a:rPr>
+              <a:t>Phylogenetic</a:t>
+            </a:r>
+          </a:p>
+          <a:p>
+            <a:r>
+              <a:rPr lang="fr-FR" sz="1400">
+                <a:latin typeface="Avenir Book" panose="02000503020000020003" pitchFamily="2" charset="0"/>
+              </a:rPr>
+              <a:t>tree</a:t>
             </a:r>
           </a:p>
         </p:txBody>

</xml_diff>